<commit_message>
TCR 02 Trainingskarten schreiben
Für die Promotion angepasst
</commit_message>
<xml_diff>
--- a/training-cards/music moves/Training Cards (TRC)/ger/apprentice/ger_TRC_02_Trainingskarten_schreiben_MM_A.pptx
+++ b/training-cards/music moves/Training Cards (TRC)/ger/apprentice/ger_TRC_02_Trainingskarten_schreiben_MM_A.pptx
@@ -108,6 +108,22 @@
       </a:defRPr>
     </a:lvl9pPr>
   </p:defaultTextStyle>
+  <p:extLst>
+    <p:ext uri="{EFAFB233-063F-42B5-8137-9DF3F51BA10A}">
+      <p15:sldGuideLst xmlns:p15="http://schemas.microsoft.com/office/powerpoint/2012/main">
+        <p15:guide id="1" orient="horz" pos="872">
+          <p15:clr>
+            <a:srgbClr val="A4A3A4"/>
+          </p15:clr>
+        </p15:guide>
+        <p15:guide id="2" pos="735">
+          <p15:clr>
+            <a:srgbClr val="A4A3A4"/>
+          </p15:clr>
+        </p15:guide>
+      </p15:sldGuideLst>
+    </p:ext>
+  </p:extLst>
 </p:presentation>
 </file>
 
@@ -193,7 +209,7 @@
           <a:p>
             <a:fld id="{F544CC07-88A2-1D43-B01E-CB3784302020}" type="datetimeFigureOut">
               <a:rPr lang="de-DE" smtClean="0"/>
-              <a:t>14.01.16</a:t>
+              <a:t>04.09.18</a:t>
             </a:fld>
             <a:endParaRPr lang="de-DE"/>
           </a:p>
@@ -321,10 +337,9 @@
           </a:lstStyle>
           <a:p>
             <a:r>
-              <a:rPr lang="de-DE" dirty="0" smtClean="0"/>
+              <a:rPr lang="de-DE" dirty="0"/>
               <a:t>TITEL HINZUFÜGEN</a:t>
             </a:r>
-            <a:endParaRPr lang="de-DE" dirty="0"/>
           </a:p>
         </p:txBody>
       </p:sp>
@@ -355,35 +370,35 @@
           <a:p>
             <a:pPr lvl="0"/>
             <a:r>
-              <a:rPr lang="de-DE" smtClean="0"/>
+              <a:rPr lang="de-DE"/>
               <a:t>Mastertextformat bearbeiten</a:t>
             </a:r>
           </a:p>
           <a:p>
             <a:pPr lvl="1"/>
             <a:r>
-              <a:rPr lang="de-DE" smtClean="0"/>
+              <a:rPr lang="de-DE"/>
               <a:t>Zweite Ebene</a:t>
             </a:r>
           </a:p>
           <a:p>
             <a:pPr lvl="2"/>
             <a:r>
-              <a:rPr lang="de-DE" smtClean="0"/>
+              <a:rPr lang="de-DE"/>
               <a:t>Dritte Ebene</a:t>
             </a:r>
           </a:p>
           <a:p>
             <a:pPr lvl="3"/>
             <a:r>
-              <a:rPr lang="de-DE" smtClean="0"/>
+              <a:rPr lang="de-DE"/>
               <a:t>Vierte Ebene</a:t>
             </a:r>
           </a:p>
           <a:p>
             <a:pPr lvl="4"/>
             <a:r>
-              <a:rPr lang="de-DE" smtClean="0"/>
+              <a:rPr lang="de-DE"/>
               <a:t>Fünfte Ebene</a:t>
             </a:r>
             <a:endParaRPr lang="de-DE" dirty="0"/>
@@ -430,7 +445,7 @@
               <a:buNone/>
             </a:pPr>
             <a:r>
-              <a:rPr lang="de-DE" smtClean="0"/>
+              <a:rPr lang="de-DE"/>
               <a:t>Master-Untertitelformat bearbeiten</a:t>
             </a:r>
             <a:endParaRPr lang="de-DE" dirty="0"/>
@@ -546,35 +561,35 @@
           <a:p>
             <a:pPr lvl="0"/>
             <a:r>
-              <a:rPr lang="de-DE" smtClean="0"/>
+              <a:rPr lang="de-DE"/>
               <a:t>Mastertextformat bearbeiten</a:t>
             </a:r>
           </a:p>
           <a:p>
             <a:pPr lvl="1"/>
             <a:r>
-              <a:rPr lang="de-DE" smtClean="0"/>
+              <a:rPr lang="de-DE"/>
               <a:t>Zweite Ebene</a:t>
             </a:r>
           </a:p>
           <a:p>
             <a:pPr lvl="2"/>
             <a:r>
-              <a:rPr lang="de-DE" smtClean="0"/>
+              <a:rPr lang="de-DE"/>
               <a:t>Dritte Ebene</a:t>
             </a:r>
           </a:p>
           <a:p>
             <a:pPr lvl="3"/>
             <a:r>
-              <a:rPr lang="de-DE" smtClean="0"/>
+              <a:rPr lang="de-DE"/>
               <a:t>Vierte Ebene</a:t>
             </a:r>
           </a:p>
           <a:p>
             <a:pPr lvl="4"/>
             <a:r>
-              <a:rPr lang="de-DE" smtClean="0"/>
+              <a:rPr lang="de-DE"/>
               <a:t>Fünfte Ebene</a:t>
             </a:r>
             <a:endParaRPr lang="de-DE" dirty="0"/>
@@ -604,7 +619,7 @@
           <a:lstStyle/>
           <a:p>
             <a:r>
-              <a:rPr lang="de-DE" sz="2400" dirty="0" smtClean="0">
+              <a:rPr lang="de-DE" sz="2400" dirty="0">
                 <a:solidFill>
                   <a:srgbClr val="7E006B"/>
                 </a:solidFill>
@@ -614,7 +629,7 @@
               <a:t>TRAININGS</a:t>
             </a:r>
             <a:r>
-              <a:rPr lang="de-DE" sz="2400" dirty="0" smtClean="0">
+              <a:rPr lang="de-DE" sz="2400" dirty="0">
                 <a:solidFill>
                   <a:srgbClr val="7E006B"/>
                 </a:solidFill>
@@ -709,10 +724,9 @@
           <a:lstStyle/>
           <a:p>
             <a:r>
-              <a:rPr lang="de-DE" smtClean="0"/>
+              <a:rPr lang="de-DE"/>
               <a:t>Mastertitelformat bearbeiten</a:t>
             </a:r>
-            <a:endParaRPr lang="de-DE"/>
           </a:p>
         </p:txBody>
       </p:sp>
@@ -733,7 +747,7 @@
           <a:p>
             <a:fld id="{FF5B2BAF-DF38-0A48-A798-0C06E514FD52}" type="datetimeFigureOut">
               <a:rPr lang="de-DE" smtClean="0"/>
-              <a:t>14.01.16</a:t>
+              <a:t>04.09.18</a:t>
             </a:fld>
             <a:endParaRPr lang="de-DE" dirty="0"/>
           </a:p>
@@ -844,17 +858,16 @@
           <a:p>
             <a:pPr marL="0" lvl="0" algn="l"/>
             <a:r>
-              <a:rPr lang="de-DE" dirty="0" smtClean="0"/>
+              <a:rPr lang="de-DE" dirty="0"/>
               <a:t>Überschrift </a:t>
             </a:r>
             <a:br>
-              <a:rPr lang="de-DE" dirty="0" smtClean="0"/>
+              <a:rPr lang="de-DE" dirty="0"/>
             </a:br>
             <a:r>
-              <a:rPr lang="de-DE" dirty="0" smtClean="0"/>
+              <a:rPr lang="de-DE" dirty="0"/>
               <a:t>bearbeiten </a:t>
             </a:r>
-            <a:endParaRPr lang="de-DE" dirty="0"/>
           </a:p>
         </p:txBody>
       </p:sp>
@@ -885,38 +898,37 @@
           <a:p>
             <a:pPr lvl="0"/>
             <a:r>
-              <a:rPr lang="de-DE" dirty="0" smtClean="0"/>
+              <a:rPr lang="de-DE" dirty="0"/>
               <a:t>Mastertextformat bearbeiten</a:t>
             </a:r>
           </a:p>
           <a:p>
             <a:pPr lvl="1"/>
             <a:r>
-              <a:rPr lang="de-DE" dirty="0" smtClean="0"/>
+              <a:rPr lang="de-DE" dirty="0"/>
               <a:t>Zweite Ebene</a:t>
             </a:r>
           </a:p>
           <a:p>
             <a:pPr lvl="2"/>
             <a:r>
-              <a:rPr lang="de-DE" dirty="0" smtClean="0"/>
+              <a:rPr lang="de-DE" dirty="0"/>
               <a:t>Dritte Ebene</a:t>
             </a:r>
           </a:p>
           <a:p>
             <a:pPr lvl="3"/>
             <a:r>
-              <a:rPr lang="de-DE" dirty="0" smtClean="0"/>
+              <a:rPr lang="de-DE" dirty="0"/>
               <a:t>Vierte Ebene</a:t>
             </a:r>
           </a:p>
           <a:p>
             <a:pPr lvl="4"/>
             <a:r>
-              <a:rPr lang="de-DE" dirty="0" smtClean="0"/>
+              <a:rPr lang="de-DE" dirty="0"/>
               <a:t>Fünfte Ebene</a:t>
             </a:r>
-            <a:endParaRPr lang="de-DE" dirty="0"/>
           </a:p>
         </p:txBody>
       </p:sp>
@@ -955,7 +967,7 @@
           <a:p>
             <a:fld id="{FF5B2BAF-DF38-0A48-A798-0C06E514FD52}" type="datetimeFigureOut">
               <a:rPr lang="de-DE" smtClean="0"/>
-              <a:t>14.01.16</a:t>
+              <a:t>04.09.18</a:t>
             </a:fld>
             <a:endParaRPr lang="de-DE" dirty="0"/>
           </a:p>
@@ -1189,7 +1201,7 @@
           <a:lstStyle/>
           <a:p>
             <a:r>
-              <a:rPr lang="de-DE" sz="1050" b="1" dirty="0" smtClean="0">
+              <a:rPr lang="de-DE" sz="1050" b="1" dirty="0">
                 <a:solidFill>
                   <a:schemeClr val="bg1"/>
                 </a:solidFill>
@@ -1199,7 +1211,7 @@
               <a:t>TRAININGSKARTE</a:t>
             </a:r>
             <a:r>
-              <a:rPr lang="de-DE" sz="1050" dirty="0" smtClean="0">
+              <a:rPr lang="de-DE" sz="1050" dirty="0">
                 <a:solidFill>
                   <a:schemeClr val="bg1"/>
                 </a:solidFill>
@@ -1209,7 +1221,7 @@
               <a:t> </a:t>
             </a:r>
             <a:r>
-              <a:rPr lang="de-DE" sz="1050" b="1" dirty="0" smtClean="0">
+              <a:rPr lang="de-DE" sz="1050" b="1" dirty="0">
                 <a:solidFill>
                   <a:schemeClr val="bg1"/>
                 </a:solidFill>
@@ -1218,13 +1230,6 @@
               </a:rPr>
               <a:t>TRC 02</a:t>
             </a:r>
-            <a:endParaRPr lang="de-DE" sz="1050" b="1" dirty="0">
-              <a:solidFill>
-                <a:schemeClr val="bg1"/>
-              </a:solidFill>
-              <a:latin typeface="Avenir Heavy"/>
-              <a:cs typeface="Avenir Heavy"/>
-            </a:endParaRPr>
           </a:p>
         </p:txBody>
       </p:sp>
@@ -1602,17 +1607,16 @@
           <a:lstStyle/>
           <a:p>
             <a:r>
-              <a:rPr lang="de-DE" dirty="0" smtClean="0">
+              <a:rPr lang="de-DE" dirty="0">
                 <a:latin typeface="Avenir Heavy"/>
                 <a:cs typeface="Avenir Heavy"/>
               </a:rPr>
               <a:t>TRAININGSKARTE</a:t>
             </a:r>
             <a:r>
-              <a:rPr lang="de-DE" dirty="0" smtClean="0"/>
+              <a:rPr lang="de-DE" dirty="0"/>
               <a:t> SCHREIBEN</a:t>
             </a:r>
-            <a:endParaRPr lang="de-DE" dirty="0"/>
           </a:p>
         </p:txBody>
       </p:sp>
@@ -1635,37 +1639,13 @@
           <a:p>
             <a:r>
               <a:rPr lang="de-DE" sz="900" dirty="0"/>
-              <a:t>Eine Trainingskarte (TK) auch „Move“ genannt, ist eine kleine Übungseinheit, die on-</a:t>
-            </a:r>
-            <a:r>
-              <a:rPr lang="de-DE" sz="900" dirty="0" err="1"/>
-              <a:t>the</a:t>
-            </a:r>
+              <a:t>Eine Trainingskarte, auch „Move“ genannt, ist eine kleine Übungseinheit, die während Deinem (Arbeits-) Alltag, dem Lernen oder Deinem musikalischen Üben durchgeführt werden kann.</a:t>
+            </a:r>
+          </a:p>
+          <a:p>
             <a:r>
               <a:rPr lang="de-DE" sz="900" dirty="0"/>
-              <a:t>-job, während Deinem (Arbeits-)Alltag, während dem Lernen oder musikalischen Üben durchgeführt werden kann.</a:t>
-            </a:r>
-          </a:p>
-          <a:p>
-            <a:r>
-              <a:rPr lang="de-DE" sz="900" dirty="0"/>
-              <a:t>Um eine TK zu schreiben </a:t>
-            </a:r>
-            <a:r>
-              <a:rPr lang="de-DE" sz="900" dirty="0" smtClean="0"/>
-              <a:t>brauchst Du </a:t>
-            </a:r>
-            <a:r>
-              <a:rPr lang="de-DE" sz="900" dirty="0"/>
-              <a:t>eine Trainingsidee, ein Ziel, das </a:t>
-            </a:r>
-            <a:r>
-              <a:rPr lang="de-DE" sz="900" dirty="0" smtClean="0"/>
-              <a:t>Dir </a:t>
-            </a:r>
-            <a:r>
-              <a:rPr lang="de-DE" sz="900" dirty="0"/>
-              <a:t>Spaß machen würde zu trainieren.</a:t>
+              <a:t>Um eine Trainingskarte zu schreiben brauchst Du eine Trainingsidee.</a:t>
             </a:r>
           </a:p>
           <a:p>
@@ -1677,165 +1657,54 @@
           <a:p>
             <a:r>
               <a:rPr lang="de-DE" sz="900" dirty="0"/>
-              <a:t>Auf der Vorderseite der Karte steht der Titel und eine Hinführung zum Move. Ein guter Titel ist kurz, schmissig vielleicht auch witzig und enthält eine Kernaussage bzw. Schlüsselwörter, die Appetit aufs Trainings </a:t>
-            </a:r>
-            <a:r>
-              <a:rPr lang="de-DE" sz="900" dirty="0" smtClean="0"/>
-              <a:t>machen.</a:t>
-            </a:r>
-          </a:p>
-          <a:p>
-            <a:r>
-              <a:rPr lang="de-DE" sz="900" dirty="0" smtClean="0"/>
-              <a:t>Die </a:t>
-            </a:r>
+              <a:t>Die Prinzipien der User Story, auf die die Trainingskarte zurückgeht,  besagen, dass nur das Nötigste aufgeschrieben werden sollte, und alles Überflüssige vermieden wird.</a:t>
+            </a:r>
+          </a:p>
+          <a:p>
             <a:r>
               <a:rPr lang="de-DE" sz="900" dirty="0"/>
-              <a:t>Bullet Points unter dem Titel beinhalten alle wichtigen Hintergrundinformationen, das Ziel des Trainings und eine Erläuterung, die den Zweck und Ablauf des Trainings verständlich macht.</a:t>
+              <a:t>Auf der Vorderseite der Karte steht der Titel und eine Hinführung zum Move. Ein guter Titel ist kurz, schmissig, vielleicht auch witzig und enthält eine Kernaussage bzw. Schlüsselwörter, die Appetit aufs Training machen.</a:t>
             </a:r>
           </a:p>
           <a:p>
             <a:r>
               <a:rPr lang="de-DE" sz="900" dirty="0"/>
-              <a:t>Die Rückseite trägt den Titel </a:t>
-            </a:r>
-            <a:r>
-              <a:rPr lang="de-DE" sz="900" dirty="0" smtClean="0"/>
-              <a:t>“</a:t>
-            </a:r>
-            <a:r>
-              <a:rPr lang="de-DE" sz="900" dirty="0" smtClean="0">
+              <a:t>Unter dem Titel stehen alle wichtigen Hintergrundinformationen, das Ziel des Trainings und eine Erläuterung, die den Zweck und Ablauf verständlich macht.</a:t>
+            </a:r>
+          </a:p>
+          <a:p>
+            <a:r>
+              <a:rPr lang="de-DE" sz="900" dirty="0"/>
+              <a:t>Die Rückseite trägt den Titel “</a:t>
+            </a:r>
+            <a:r>
+              <a:rPr lang="de-DE" sz="900" dirty="0">
                 <a:latin typeface="Avenir Heavy"/>
                 <a:cs typeface="Avenir Heavy"/>
               </a:rPr>
               <a:t>TRAININGS</a:t>
             </a:r>
             <a:r>
-              <a:rPr lang="de-DE" sz="900" dirty="0" smtClean="0"/>
-              <a:t>AUFGABEN“.</a:t>
-            </a:r>
-          </a:p>
-          <a:p>
-            <a:r>
-              <a:rPr lang="de-DE" sz="900" dirty="0" smtClean="0"/>
-              <a:t>Dort </a:t>
-            </a:r>
-            <a:r>
               <a:rPr lang="de-DE" sz="900" dirty="0"/>
-              <a:t>stehen genaue und nachvollziehbare Handlungsanweisungen. Sie fordern zu Ergebnissen auf, die für das Team, das </a:t>
-            </a:r>
-            <a:r>
-              <a:rPr lang="de-DE" sz="900" dirty="0" smtClean="0"/>
-              <a:t>Deine  </a:t>
-            </a:r>
+              <a:t>AUFGABEN“. Dort stehen genaue und nachvollziehbare Handlungsanweisungen. Sie fordern zu Ergebnissen auf, und machen sie für Dich und Dein Team sichtbar.</a:t>
+            </a:r>
+          </a:p>
+          <a:p>
             <a:r>
               <a:rPr lang="de-DE" sz="900" dirty="0"/>
-              <a:t>Zertifizierung begleitet, sichtbar sind.</a:t>
+              <a:t>Mit den Kontrollkästchen, kannst du abhaken und somit messen, was Du alles geschafft hast.</a:t>
             </a:r>
           </a:p>
           <a:p>
             <a:r>
               <a:rPr lang="de-DE" sz="900" dirty="0"/>
-              <a:t>Für den </a:t>
-            </a:r>
-            <a:r>
-              <a:rPr lang="de-DE" sz="900" dirty="0" err="1"/>
-              <a:t>Apprentice</a:t>
-            </a:r>
+              <a:t>Eine Trainingskarte bezieht sich immer auf einen Trainingszeitraum von zwei Wochen.</a:t>
+            </a:r>
+          </a:p>
+          <a:p>
             <a:r>
               <a:rPr lang="de-DE" sz="900" dirty="0"/>
-              <a:t> Level ist ein Trainingszeitraum von zwei Wochen Standard.</a:t>
-            </a:r>
-          </a:p>
-          <a:p>
-            <a:r>
-              <a:rPr lang="de-DE" sz="900" dirty="0"/>
-              <a:t>Nach den Prinzipien des </a:t>
-            </a:r>
-            <a:r>
-              <a:rPr lang="de-DE" sz="900" dirty="0" err="1"/>
-              <a:t>Kaizen</a:t>
-            </a:r>
-            <a:r>
-              <a:rPr lang="de-DE" sz="900" dirty="0"/>
-              <a:t> ist es wichtig, dass der Trainingsschritt klein genug ist, um nicht zu überfordern. Wenn </a:t>
-            </a:r>
-            <a:r>
-              <a:rPr lang="de-DE" sz="900" dirty="0" smtClean="0"/>
-              <a:t>Du </a:t>
-            </a:r>
-            <a:r>
-              <a:rPr lang="de-DE" sz="900" dirty="0"/>
-              <a:t>also zweifelst, wie viele Wiederholungen sinnvoll sind, nimm die kleinstmögliche Variante, die zwar eine Gewöhnung an den Move erlauben aber den Move auch leicht </a:t>
-            </a:r>
-            <a:r>
-              <a:rPr lang="de-DE" sz="900" dirty="0" err="1"/>
-              <a:t>stemmbar</a:t>
-            </a:r>
-            <a:r>
-              <a:rPr lang="de-DE" sz="900" dirty="0"/>
-              <a:t> machen.</a:t>
-            </a:r>
-          </a:p>
-          <a:p>
-            <a:r>
-              <a:rPr lang="de-DE" sz="900" dirty="0"/>
-              <a:t>Das Icon auf der Rückseite zeigt den jeweiligen Level an: </a:t>
-            </a:r>
-            <a:endParaRPr lang="de-DE" sz="900" dirty="0" smtClean="0"/>
-          </a:p>
-          <a:p>
-            <a:pPr lvl="1"/>
-            <a:r>
-              <a:rPr lang="de-DE" sz="900" dirty="0" smtClean="0"/>
-              <a:t>Baseballkappe </a:t>
-            </a:r>
-            <a:r>
-              <a:rPr lang="de-DE" sz="900" dirty="0"/>
-              <a:t>= </a:t>
-            </a:r>
-            <a:r>
-              <a:rPr lang="de-DE" sz="900" dirty="0" err="1" smtClean="0"/>
-              <a:t>Apprentice</a:t>
-            </a:r>
-            <a:r>
-              <a:rPr lang="de-DE" sz="900" dirty="0" smtClean="0"/>
-              <a:t> </a:t>
-            </a:r>
-          </a:p>
-          <a:p>
-            <a:pPr lvl="1"/>
-            <a:r>
-              <a:rPr lang="de-DE" sz="900" dirty="0" smtClean="0"/>
-              <a:t>Gesellenhut </a:t>
-            </a:r>
-            <a:r>
-              <a:rPr lang="de-DE" sz="900" dirty="0"/>
-              <a:t>= </a:t>
-            </a:r>
-            <a:r>
-              <a:rPr lang="de-DE" sz="900" dirty="0" err="1" smtClean="0"/>
-              <a:t>Journeyman</a:t>
-            </a:r>
-            <a:endParaRPr lang="de-DE" sz="900" dirty="0" smtClean="0"/>
-          </a:p>
-          <a:p>
-            <a:pPr lvl="1"/>
-            <a:r>
-              <a:rPr lang="de-DE" sz="900" dirty="0" smtClean="0"/>
-              <a:t>Doktorhut </a:t>
-            </a:r>
-            <a:r>
-              <a:rPr lang="de-DE" sz="900"/>
-              <a:t>= </a:t>
-            </a:r>
-            <a:r>
-              <a:rPr lang="de-DE" sz="900" smtClean="0"/>
-              <a:t>Master</a:t>
-            </a:r>
-            <a:r>
-              <a:rPr lang="de-DE" sz="900" dirty="0"/>
-              <a:t> </a:t>
+              <a:t>Solltest Du zweifeln, wie viele Wiederholungen für zwei Wochen sinnvoll sind, nimm lieber die kleinere Variante. So wird das Erfolgserlebnis wahrscheinlicher.</a:t>
             </a:r>
           </a:p>
         </p:txBody>
@@ -1859,18 +1728,13 @@
               <a:buNone/>
             </a:pPr>
             <a:r>
-              <a:rPr lang="de-DE" dirty="0" err="1" smtClean="0"/>
+              <a:rPr lang="de-DE" dirty="0" err="1"/>
               <a:t>ReGINA</a:t>
             </a:r>
             <a:r>
-              <a:rPr lang="de-DE" dirty="0" smtClean="0"/>
-              <a:t> </a:t>
-            </a:r>
-            <a:r>
-              <a:rPr lang="de-DE" dirty="0" smtClean="0"/>
-              <a:t>BRANDHUBER</a:t>
-            </a:r>
-            <a:endParaRPr lang="de-DE" dirty="0"/>
+              <a:rPr lang="de-DE" dirty="0"/>
+              <a:t> BRANDHUBER</a:t>
+            </a:r>
           </a:p>
         </p:txBody>
       </p:sp>
@@ -1921,27 +1785,27 @@
           <a:p>
             <a:r>
               <a:rPr lang="de-DE" dirty="0"/>
-              <a:t>Diskutiere Deine Trainingsidee mit einem Teammitglied</a:t>
-            </a:r>
-            <a:r>
-              <a:rPr lang="de-DE" dirty="0" smtClean="0"/>
-              <a:t>.</a:t>
-            </a:r>
-          </a:p>
-          <a:p>
-            <a:r>
-              <a:rPr lang="de-DE" dirty="0" smtClean="0"/>
-              <a:t> </a:t>
-            </a:r>
+              <a:t>Diskutiere Deine Trainingsidee mit einem Teammitglied.</a:t>
+            </a:r>
+          </a:p>
+          <a:p>
             <a:r>
               <a:rPr lang="de-DE" dirty="0"/>
-              <a:t>Sucht zusammen Aspekte für die Vorderseite, indem ihr alle Gedanken zu dem Thema brainstormt.</a:t>
+              <a:t> Sucht zusammen Aspekte für die Vorderseite, indem ihr alle Gedanken zu dem Thema brainstormt.</a:t>
             </a:r>
           </a:p>
           <a:p>
             <a:r>
               <a:rPr lang="de-DE" dirty="0"/>
-              <a:t>Schreibe die TK nach allen Regeln der Kunst.</a:t>
+              <a:t>Schreibe </a:t>
+            </a:r>
+            <a:r>
+              <a:rPr lang="de-DE"/>
+              <a:t>die Trainingskarte </a:t>
+            </a:r>
+            <a:r>
+              <a:rPr lang="de-DE" dirty="0"/>
+              <a:t>nach allen Regeln der Kunst.</a:t>
             </a:r>
           </a:p>
           <a:p>
@@ -1953,31 +1817,7 @@
           <a:p>
             <a:r>
               <a:rPr lang="de-DE" dirty="0"/>
-              <a:t>Schreibe in </a:t>
-            </a:r>
-            <a:r>
-              <a:rPr lang="de-DE" dirty="0"/>
-              <a:t>2</a:t>
-            </a:r>
-            <a:r>
-              <a:rPr lang="de-DE" dirty="0" smtClean="0"/>
-              <a:t> </a:t>
-            </a:r>
-            <a:r>
-              <a:rPr lang="de-DE" dirty="0"/>
-              <a:t>Wochen </a:t>
-            </a:r>
-            <a:r>
-              <a:rPr lang="de-DE" dirty="0"/>
-              <a:t>2</a:t>
-            </a:r>
-            <a:r>
-              <a:rPr lang="de-DE" dirty="0" smtClean="0"/>
-              <a:t> </a:t>
-            </a:r>
-            <a:r>
-              <a:rPr lang="de-DE" dirty="0"/>
-              <a:t>Trainingskarten für Dich und Dein Team. </a:t>
+              <a:t>Schreibe in 2 Wochen 2 Trainingskarten für Dich und Dein Team. </a:t>
             </a:r>
           </a:p>
         </p:txBody>
@@ -2001,7 +1841,7 @@
           </a:ln>
           <a:extLst>
             <a:ext uri="{C572A759-6A51-4108-AA02-DFA0A04FC94B}">
-              <ma14:wrappingTextBoxFlag xmlns:ma14="http://schemas.microsoft.com/office/mac/drawingml/2011/main" val="1"/>
+              <ma14:wrappingTextBoxFlag xmlns:ma14="http://schemas.microsoft.com/office/mac/drawingml/2011/main" xmlns="" val="1"/>
             </a:ext>
           </a:extLst>
         </p:spPr>
@@ -2107,7 +1947,7 @@
                 <a:latin typeface="Avenir Light"/>
                 <a:cs typeface="Avenir Light"/>
               </a:rPr>
-              <a:t>14.01.16</a:t>
+              <a:t>04.09.18</a:t>
             </a:fld>
             <a:endParaRPr lang="de-DE" sz="600" dirty="0">
               <a:solidFill>

</xml_diff>

<commit_message>
TRC 02 Quelle und Blocksatz
</commit_message>
<xml_diff>
--- a/training-cards/music moves/Training Cards (TRC)/ger/apprentice/ger_TRC_02_Trainingskarten_schreiben_MM_A.pptx
+++ b/training-cards/music moves/Training Cards (TRC)/ger/apprentice/ger_TRC_02_Trainingskarten_schreiben_MM_A.pptx
@@ -209,7 +209,7 @@
           <a:p>
             <a:fld id="{F544CC07-88A2-1D43-B01E-CB3784302020}" type="datetimeFigureOut">
               <a:rPr lang="de-DE" smtClean="0"/>
-              <a:t>25.07.23</a:t>
+              <a:t>04.08.24</a:t>
             </a:fld>
             <a:endParaRPr lang="de-DE"/>
           </a:p>
@@ -747,7 +747,7 @@
           <a:p>
             <a:fld id="{FF5B2BAF-DF38-0A48-A798-0C06E514FD52}" type="datetimeFigureOut">
               <a:rPr lang="de-DE" smtClean="0"/>
-              <a:t>25.07.23</a:t>
+              <a:t>04.08.24</a:t>
             </a:fld>
             <a:endParaRPr lang="de-DE" dirty="0"/>
           </a:p>
@@ -967,7 +967,7 @@
           <a:p>
             <a:fld id="{FF5B2BAF-DF38-0A48-A798-0C06E514FD52}" type="datetimeFigureOut">
               <a:rPr lang="de-DE" smtClean="0"/>
-              <a:t>25.07.23</a:t>
+              <a:t>04.08.24</a:t>
             </a:fld>
             <a:endParaRPr lang="de-DE" dirty="0"/>
           </a:p>
@@ -1630,49 +1630,83 @@
             <p:ph idx="13"/>
           </p:nvPr>
         </p:nvSpPr>
-        <p:spPr/>
+        <p:spPr>
+          <a:xfrm>
+            <a:off x="858838" y="1568452"/>
+            <a:ext cx="6252255" cy="3485241"/>
+          </a:xfrm>
+        </p:spPr>
         <p:txBody>
           <a:bodyPr>
             <a:noAutofit/>
           </a:bodyPr>
           <a:lstStyle/>
           <a:p>
+            <a:pPr algn="just"/>
             <a:r>
               <a:rPr lang="de-DE" sz="900" dirty="0"/>
-              <a:t>Eine Trainingskarte, auch „Move“ genannt, ist eine kleine Übungseinheit, die während Deinem (Arbeits-) Alltag, dem Lernen oder Deinem musikalischen Üben durchgeführt werden kann.</a:t>
-            </a:r>
-          </a:p>
-          <a:p>
+              <a:t>Eine Trainingskarte, ist eine kleine Übungseinheit, die während Deinem (Arbeits-) Alltag, dem Lernen oder Deinem musikalischen Üben durchgeführt werden kann.</a:t>
+            </a:r>
+          </a:p>
+          <a:p>
+            <a:pPr algn="just"/>
             <a:r>
               <a:rPr lang="de-DE" sz="900" dirty="0"/>
-              <a:t>Um eine Trainingskarte zu schreiben brauchst Du eine Trainingsidee.</a:t>
-            </a:r>
-          </a:p>
-          <a:p>
+              <a:t>Um eine Trainingskarte </a:t>
+            </a:r>
+            <a:r>
+              <a:rPr lang="de-DE" sz="900"/>
+              <a:t>zu schreiben, </a:t>
+            </a:r>
+            <a:r>
+              <a:rPr lang="de-DE" sz="900" dirty="0"/>
+              <a:t>brauchst Du eine Trainingsidee.</a:t>
+            </a:r>
+          </a:p>
+          <a:p>
+            <a:pPr algn="just"/>
             <a:r>
               <a:rPr lang="de-DE" sz="900" dirty="0"/>
               <a:t>Eine Karte hat verschiedene inhaltliche Elemente: Titel, Einführung ins Thema und Trainingsaufgaben.</a:t>
             </a:r>
           </a:p>
           <a:p>
+            <a:pPr algn="just"/>
             <a:r>
               <a:rPr lang="de-DE" sz="900" dirty="0"/>
-              <a:t>Die Prinzipien der User Story, auf die die Trainingskarte zurückgeht,  besagen, dass nur das Nötigste aufgeschrieben werden sollte, und alles Überflüssige vermieden wird.</a:t>
-            </a:r>
-          </a:p>
-          <a:p>
+              <a:t>Die Prinzipien der User Story, auf die die Trainingskarte zurückgeht, besagen, dass nur das Nötigste aufgeschrieben werden sollte, und alles Überflüssige vermieden wird (vgl. </a:t>
+            </a:r>
+            <a:r>
+              <a:rPr lang="de-DE" sz="900" dirty="0" err="1"/>
+              <a:t>Wirdemann</a:t>
+            </a:r>
             <a:r>
               <a:rPr lang="de-DE" sz="900" dirty="0"/>
-              <a:t>Auf der Vorderseite der Karte steht der Titel und eine Hinführung zum Move. Ein guter Titel ist kurz, schmissig, vielleicht auch witzig und enthält eine Kernaussage bzw. Schlüsselwörter, die Appetit aufs Training machen.</a:t>
-            </a:r>
-          </a:p>
-          <a:p>
+              <a:t> 2011, S. 54).</a:t>
+            </a:r>
+          </a:p>
+          <a:p>
+            <a:pPr algn="just"/>
+            <a:r>
+              <a:rPr lang="de-DE" sz="900" dirty="0"/>
+              <a:t>Auf der Vorderseite der Karte steht der Titel und eine Hinführung zum Thema. Ein guter Titel ist kurz, schmissig, vielleicht auch witzig und enthält eine Kernaussage bzw. Schlüsselwörter, die Appetit aufs Training machen.</a:t>
+            </a:r>
+          </a:p>
+          <a:p>
+            <a:pPr algn="just"/>
             <a:r>
               <a:rPr lang="de-DE" sz="900" dirty="0"/>
               <a:t>Unter dem Titel stehen alle wichtigen Hintergrundinformationen, das Ziel des Trainings und eine Erläuterung, die den Zweck und Ablauf verständlich macht.</a:t>
             </a:r>
           </a:p>
           <a:p>
+            <a:pPr marL="0" indent="0" algn="just">
+              <a:buNone/>
+            </a:pPr>
+            <a:endParaRPr lang="de-DE" sz="900" dirty="0"/>
+          </a:p>
+          <a:p>
+            <a:pPr algn="just"/>
             <a:r>
               <a:rPr lang="de-DE" sz="900" dirty="0"/>
               <a:t>Die Rückseite trägt den Titel “</a:t>
@@ -1690,22 +1724,110 @@
             </a:r>
           </a:p>
           <a:p>
+            <a:pPr algn="just"/>
             <a:r>
               <a:rPr lang="de-DE" sz="900" dirty="0"/>
               <a:t>Mit den Kontrollkästchen, kannst du abhaken und somit messen, was Du alles geschafft hast.</a:t>
             </a:r>
           </a:p>
           <a:p>
+            <a:pPr algn="just"/>
             <a:r>
               <a:rPr lang="de-DE" sz="900" dirty="0"/>
               <a:t>Eine Trainingskarte bezieht sich immer auf einen Trainingszeitraum von zwei Wochen.</a:t>
             </a:r>
           </a:p>
           <a:p>
+            <a:pPr algn="just"/>
             <a:r>
               <a:rPr lang="de-DE" sz="900" dirty="0"/>
-              <a:t>Solltest Du zweifeln, wie viele Wiederholungen für zwei Wochen sinnvoll sind, nimm lieber die kleinere Variante. So wird das Erfolgserlebnis wahrscheinlicher.</a:t>
-            </a:r>
+              <a:t>Solltest Du zweifeln, wie viele Wiederholungen für zwei Wochen sinnvoll sind, nimm lieber eine kleinere Variante. So wird das Erfolgserlebnis wahrscheinlicher.</a:t>
+            </a:r>
+          </a:p>
+          <a:p>
+            <a:pPr algn="just"/>
+            <a:endParaRPr lang="de-DE" sz="900" dirty="0"/>
+          </a:p>
+          <a:p>
+            <a:pPr algn="just"/>
+            <a:endParaRPr lang="de-DE" sz="900" dirty="0"/>
+          </a:p>
+          <a:p>
+            <a:pPr marL="0" indent="0" algn="just">
+              <a:buNone/>
+            </a:pPr>
+            <a:endParaRPr lang="de-DE" sz="900" dirty="0"/>
+          </a:p>
+          <a:p>
+            <a:pPr marL="0" indent="0" algn="just">
+              <a:buNone/>
+            </a:pPr>
+            <a:r>
+              <a:rPr lang="de-DE" sz="800" b="1" dirty="0">
+                <a:solidFill>
+                  <a:srgbClr val="747982"/>
+                </a:solidFill>
+                <a:latin typeface="Avenir Book"/>
+                <a:cs typeface="Avenir Book"/>
+              </a:rPr>
+              <a:t>Quelle:</a:t>
+            </a:r>
+            <a:r>
+              <a:rPr lang="de-DE" sz="800" dirty="0">
+                <a:solidFill>
+                  <a:srgbClr val="747982"/>
+                </a:solidFill>
+                <a:latin typeface="Avenir Book"/>
+                <a:cs typeface="Avenir Book"/>
+              </a:rPr>
+              <a:t> </a:t>
+            </a:r>
+            <a:r>
+              <a:rPr lang="de-DE" sz="800" b="1" dirty="0" err="1">
+                <a:solidFill>
+                  <a:srgbClr val="747982"/>
+                </a:solidFill>
+                <a:latin typeface="Avenir Book"/>
+                <a:cs typeface="Avenir Book"/>
+              </a:rPr>
+              <a:t>Wirdemann</a:t>
+            </a:r>
+            <a:r>
+              <a:rPr lang="de-DE" sz="800" dirty="0">
+                <a:solidFill>
+                  <a:srgbClr val="747982"/>
+                </a:solidFill>
+                <a:latin typeface="Avenir Book"/>
+                <a:cs typeface="Avenir Book"/>
+              </a:rPr>
+              <a:t>, Ralf (2011): </a:t>
+            </a:r>
+            <a:r>
+              <a:rPr lang="de-DE" sz="800" dirty="0" err="1">
+                <a:solidFill>
+                  <a:srgbClr val="747982"/>
+                </a:solidFill>
+                <a:latin typeface="Avenir Book"/>
+                <a:cs typeface="Avenir Book"/>
+              </a:rPr>
+              <a:t>Scrum</a:t>
+            </a:r>
+            <a:r>
+              <a:rPr lang="de-DE" sz="800" dirty="0">
+                <a:solidFill>
+                  <a:srgbClr val="747982"/>
+                </a:solidFill>
+                <a:latin typeface="Avenir Book"/>
+                <a:cs typeface="Avenir Book"/>
+              </a:rPr>
+              <a:t> mit User Stories. 2. Auflage. München und Wien: Hanser</a:t>
+            </a:r>
+          </a:p>
+          <a:p>
+            <a:pPr marL="0" indent="0" algn="just">
+              <a:buNone/>
+            </a:pPr>
+            <a:endParaRPr lang="de-DE" sz="900" dirty="0"/>
           </a:p>
         </p:txBody>
       </p:sp>
@@ -1778,45 +1900,49 @@
             <p:ph idx="1"/>
           </p:nvPr>
         </p:nvSpPr>
-        <p:spPr/>
+        <p:spPr>
+          <a:xfrm>
+            <a:off x="858838" y="1555750"/>
+            <a:ext cx="6235926" cy="3133835"/>
+          </a:xfrm>
+        </p:spPr>
         <p:txBody>
-          <a:bodyPr/>
+          <a:bodyPr>
+            <a:normAutofit/>
+          </a:bodyPr>
           <a:lstStyle/>
           <a:p>
-            <a:r>
-              <a:rPr lang="de-DE" dirty="0"/>
+            <a:pPr algn="just"/>
+            <a:r>
+              <a:rPr lang="de-DE" sz="1200" dirty="0"/>
               <a:t>Diskutiere Deine Trainingsidee mit einem Teammitglied.</a:t>
             </a:r>
           </a:p>
           <a:p>
-            <a:r>
-              <a:rPr lang="de-DE" dirty="0"/>
+            <a:pPr algn="just"/>
+            <a:r>
+              <a:rPr lang="de-DE" sz="1200" dirty="0"/>
               <a:t> Sucht zusammen Aspekte für die Vorderseite, indem ihr alle Gedanken zu dem Thema brainstormt.</a:t>
             </a:r>
           </a:p>
           <a:p>
-            <a:r>
-              <a:rPr lang="de-DE" dirty="0"/>
-              <a:t>Schreibe </a:t>
-            </a:r>
-            <a:r>
-              <a:rPr lang="de-DE"/>
-              <a:t>die Trainingskarte </a:t>
-            </a:r>
-            <a:r>
-              <a:rPr lang="de-DE" dirty="0"/>
-              <a:t>nach allen Regeln der Kunst.</a:t>
-            </a:r>
-          </a:p>
-          <a:p>
-            <a:r>
-              <a:rPr lang="de-DE" dirty="0"/>
+            <a:pPr algn="just"/>
+            <a:r>
+              <a:rPr lang="de-DE" sz="1200" dirty="0"/>
+              <a:t>Schreibe die Trainingskarte nach allen Regeln der Kunst.</a:t>
+            </a:r>
+          </a:p>
+          <a:p>
+            <a:pPr algn="just"/>
+            <a:r>
+              <a:rPr lang="de-DE" sz="1200" dirty="0"/>
               <a:t>Lass Dir von Deinem Team Feedback geben und überarbeite die Karte dementsprechend.</a:t>
             </a:r>
           </a:p>
           <a:p>
-            <a:r>
-              <a:rPr lang="de-DE" dirty="0"/>
+            <a:pPr algn="just"/>
+            <a:r>
+              <a:rPr lang="de-DE" sz="1200" dirty="0"/>
               <a:t>Schreibe in 2 Wochen 2 Trainingskarten für Dich und Dein Team. </a:t>
             </a:r>
           </a:p>
@@ -1847,7 +1973,7 @@
           </a:ln>
           <a:extLst>
             <a:ext uri="{C572A759-6A51-4108-AA02-DFA0A04FC94B}">
-              <ma14:wrappingTextBoxFlag xmlns:ma14="http://schemas.microsoft.com/office/mac/drawingml/2011/main" xmlns="" val="1"/>
+              <ma14:wrappingTextBoxFlag xmlns="" xmlns:ma14="http://schemas.microsoft.com/office/mac/drawingml/2011/main" val="1"/>
             </a:ext>
           </a:extLst>
         </p:spPr>

</xml_diff>

<commit_message>
TCR 02 Zeile zu viel. Layout überarbeitet
</commit_message>
<xml_diff>
--- a/training-cards/music moves/Training Cards (TRC)/ger/apprentice/ger_TRC_02_Trainingskarten_schreiben_MM_A.pptx
+++ b/training-cards/music moves/Training Cards (TRC)/ger/apprentice/ger_TRC_02_Trainingskarten_schreiben_MM_A.pptx
@@ -209,7 +209,7 @@
           <a:p>
             <a:fld id="{F544CC07-88A2-1D43-B01E-CB3784302020}" type="datetimeFigureOut">
               <a:rPr lang="de-DE" smtClean="0"/>
-              <a:t>04.08.24</a:t>
+              <a:t>27.02.25</a:t>
             </a:fld>
             <a:endParaRPr lang="de-DE"/>
           </a:p>
@@ -747,7 +747,7 @@
           <a:p>
             <a:fld id="{FF5B2BAF-DF38-0A48-A798-0C06E514FD52}" type="datetimeFigureOut">
               <a:rPr lang="de-DE" smtClean="0"/>
-              <a:t>04.08.24</a:t>
+              <a:t>27.02.25</a:t>
             </a:fld>
             <a:endParaRPr lang="de-DE" dirty="0"/>
           </a:p>
@@ -967,7 +967,7 @@
           <a:p>
             <a:fld id="{FF5B2BAF-DF38-0A48-A798-0C06E514FD52}" type="datetimeFigureOut">
               <a:rPr lang="de-DE" smtClean="0"/>
-              <a:t>04.08.24</a:t>
+              <a:t>27.02.25</a:t>
             </a:fld>
             <a:endParaRPr lang="de-DE" dirty="0"/>
           </a:p>
@@ -1644,112 +1644,96 @@
           <a:p>
             <a:pPr algn="just"/>
             <a:r>
-              <a:rPr lang="de-DE" sz="900" dirty="0"/>
+              <a:rPr lang="de-DE" dirty="0"/>
               <a:t>Eine Trainingskarte, ist eine kleine Übungseinheit, die während Deinem (Arbeits-) Alltag, dem Lernen oder Deinem musikalischen Üben durchgeführt werden kann.</a:t>
             </a:r>
           </a:p>
           <a:p>
             <a:pPr algn="just"/>
             <a:r>
-              <a:rPr lang="de-DE" sz="900" dirty="0"/>
-              <a:t>Um eine Trainingskarte </a:t>
-            </a:r>
-            <a:r>
-              <a:rPr lang="de-DE" sz="900"/>
-              <a:t>zu schreiben, </a:t>
-            </a:r>
-            <a:r>
-              <a:rPr lang="de-DE" sz="900" dirty="0"/>
-              <a:t>brauchst Du eine Trainingsidee.</a:t>
+              <a:rPr lang="de-DE" dirty="0"/>
+              <a:t>Um eine Trainingskarte zu schreiben, brauchst Du eine Trainingsidee.</a:t>
             </a:r>
           </a:p>
           <a:p>
             <a:pPr algn="just"/>
             <a:r>
-              <a:rPr lang="de-DE" sz="900" dirty="0"/>
+              <a:rPr lang="de-DE" dirty="0"/>
               <a:t>Eine Karte hat verschiedene inhaltliche Elemente: Titel, Einführung ins Thema und Trainingsaufgaben.</a:t>
             </a:r>
           </a:p>
           <a:p>
             <a:pPr algn="just"/>
             <a:r>
-              <a:rPr lang="de-DE" sz="900" dirty="0"/>
+              <a:rPr lang="de-DE" dirty="0"/>
               <a:t>Die Prinzipien der User Story, auf die die Trainingskarte zurückgeht, besagen, dass nur das Nötigste aufgeschrieben werden sollte, und alles Überflüssige vermieden wird (vgl. </a:t>
             </a:r>
             <a:r>
-              <a:rPr lang="de-DE" sz="900" dirty="0" err="1"/>
+              <a:rPr lang="de-DE" dirty="0" err="1"/>
               <a:t>Wirdemann</a:t>
             </a:r>
             <a:r>
-              <a:rPr lang="de-DE" sz="900" dirty="0"/>
+              <a:rPr lang="de-DE" dirty="0"/>
               <a:t> 2011, S. 54).</a:t>
             </a:r>
           </a:p>
           <a:p>
             <a:pPr algn="just"/>
             <a:r>
-              <a:rPr lang="de-DE" sz="900" dirty="0"/>
+              <a:rPr lang="de-DE" dirty="0"/>
               <a:t>Auf der Vorderseite der Karte steht der Titel und eine Hinführung zum Thema. Ein guter Titel ist kurz, schmissig, vielleicht auch witzig und enthält eine Kernaussage bzw. Schlüsselwörter, die Appetit aufs Training machen.</a:t>
             </a:r>
           </a:p>
           <a:p>
             <a:pPr algn="just"/>
             <a:r>
-              <a:rPr lang="de-DE" sz="900" dirty="0"/>
+              <a:rPr lang="de-DE" dirty="0"/>
               <a:t>Unter dem Titel stehen alle wichtigen Hintergrundinformationen, das Ziel des Trainings und eine Erläuterung, die den Zweck und Ablauf verständlich macht.</a:t>
             </a:r>
           </a:p>
           <a:p>
-            <a:pPr marL="0" indent="0" algn="just">
-              <a:buNone/>
-            </a:pPr>
-            <a:endParaRPr lang="de-DE" sz="900" dirty="0"/>
-          </a:p>
-          <a:p>
             <a:pPr algn="just"/>
             <a:r>
-              <a:rPr lang="de-DE" sz="900" dirty="0"/>
+              <a:rPr lang="de-DE" dirty="0"/>
               <a:t>Die Rückseite trägt den Titel “</a:t>
             </a:r>
             <a:r>
-              <a:rPr lang="de-DE" sz="900" dirty="0">
+              <a:rPr lang="de-DE" dirty="0">
                 <a:latin typeface="Avenir Heavy"/>
                 <a:cs typeface="Avenir Heavy"/>
               </a:rPr>
               <a:t>TRAININGS</a:t>
             </a:r>
             <a:r>
-              <a:rPr lang="de-DE" sz="900" dirty="0"/>
+              <a:rPr lang="de-DE" dirty="0"/>
               <a:t>AUFGABEN“. Dort stehen genaue und nachvollziehbare Handlungsanweisungen. Sie fordern zu Ergebnissen auf, und machen sie für Dich und Dein Team sichtbar.</a:t>
             </a:r>
           </a:p>
           <a:p>
             <a:pPr algn="just"/>
             <a:r>
-              <a:rPr lang="de-DE" sz="900" dirty="0"/>
+              <a:rPr lang="de-DE" dirty="0"/>
               <a:t>Mit den Kontrollkästchen, kannst du abhaken und somit messen, was Du alles geschafft hast.</a:t>
             </a:r>
           </a:p>
           <a:p>
             <a:pPr algn="just"/>
             <a:r>
-              <a:rPr lang="de-DE" sz="900" dirty="0"/>
+              <a:rPr lang="de-DE" dirty="0"/>
               <a:t>Eine Trainingskarte bezieht sich immer auf einen Trainingszeitraum von zwei Wochen.</a:t>
             </a:r>
           </a:p>
           <a:p>
             <a:pPr algn="just"/>
             <a:r>
-              <a:rPr lang="de-DE" sz="900" dirty="0"/>
+              <a:rPr lang="de-DE" dirty="0"/>
               <a:t>Solltest Du zweifeln, wie viele Wiederholungen für zwei Wochen sinnvoll sind, nimm lieber eine kleinere Variante. So wird das Erfolgserlebnis wahrscheinlicher.</a:t>
             </a:r>
           </a:p>
           <a:p>
-            <a:pPr algn="just"/>
-            <a:endParaRPr lang="de-DE" sz="900" dirty="0"/>
-          </a:p>
-          <a:p>
-            <a:pPr algn="just"/>
+            <a:pPr marL="0" indent="0" algn="just">
+              <a:buNone/>
+            </a:pPr>
             <a:endParaRPr lang="de-DE" sz="900" dirty="0"/>
           </a:p>
           <a:p>
@@ -1973,7 +1957,7 @@
           </a:ln>
           <a:extLst>
             <a:ext uri="{C572A759-6A51-4108-AA02-DFA0A04FC94B}">
-              <ma14:wrappingTextBoxFlag xmlns="" xmlns:ma14="http://schemas.microsoft.com/office/mac/drawingml/2011/main" val="1"/>
+              <ma14:wrappingTextBoxFlag xmlns:ma14="http://schemas.microsoft.com/office/mac/drawingml/2011/main" xmlns="" val="1"/>
             </a:ext>
           </a:extLst>
         </p:spPr>

</xml_diff>

<commit_message>
TRC 2 Komma zu viel
</commit_message>
<xml_diff>
--- a/training-cards/music moves/Training Cards (TRC)/ger/apprentice/ger_TRC_02_Trainingskarten_schreiben_MM_A.pptx
+++ b/training-cards/music moves/Training Cards (TRC)/ger/apprentice/ger_TRC_02_Trainingskarten_schreiben_MM_A.pptx
@@ -209,7 +209,7 @@
           <a:p>
             <a:fld id="{F544CC07-88A2-1D43-B01E-CB3784302020}" type="datetimeFigureOut">
               <a:rPr lang="de-DE" smtClean="0"/>
-              <a:t>27.02.25</a:t>
+              <a:t>09.03.25</a:t>
             </a:fld>
             <a:endParaRPr lang="de-DE"/>
           </a:p>
@@ -747,7 +747,7 @@
           <a:p>
             <a:fld id="{FF5B2BAF-DF38-0A48-A798-0C06E514FD52}" type="datetimeFigureOut">
               <a:rPr lang="de-DE" smtClean="0"/>
-              <a:t>27.02.25</a:t>
+              <a:t>09.03.25</a:t>
             </a:fld>
             <a:endParaRPr lang="de-DE" dirty="0"/>
           </a:p>
@@ -967,7 +967,7 @@
           <a:p>
             <a:fld id="{FF5B2BAF-DF38-0A48-A798-0C06E514FD52}" type="datetimeFigureOut">
               <a:rPr lang="de-DE" smtClean="0"/>
-              <a:t>27.02.25</a:t>
+              <a:t>09.03.25</a:t>
             </a:fld>
             <a:endParaRPr lang="de-DE" dirty="0"/>
           </a:p>
@@ -1713,7 +1713,15 @@
             <a:pPr algn="just"/>
             <a:r>
               <a:rPr lang="de-DE" dirty="0"/>
-              <a:t>Mit den Kontrollkästchen, kannst du abhaken und somit messen, was Du alles geschafft hast.</a:t>
+              <a:t>Mit </a:t>
+            </a:r>
+            <a:r>
+              <a:rPr lang="de-DE"/>
+              <a:t>den Kontrollkästchen </a:t>
+            </a:r>
+            <a:r>
+              <a:rPr lang="de-DE" dirty="0"/>
+              <a:t>kannst du abhaken und somit messen, was Du alles geschafft hast.</a:t>
             </a:r>
           </a:p>
           <a:p>
@@ -1957,7 +1965,7 @@
           </a:ln>
           <a:extLst>
             <a:ext uri="{C572A759-6A51-4108-AA02-DFA0A04FC94B}">
-              <ma14:wrappingTextBoxFlag xmlns:ma14="http://schemas.microsoft.com/office/mac/drawingml/2011/main" xmlns="" val="1"/>
+              <ma14:wrappingTextBoxFlag xmlns="" xmlns:ma14="http://schemas.microsoft.com/office/mac/drawingml/2011/main" val="1"/>
             </a:ext>
           </a:extLst>
         </p:spPr>

</xml_diff>